<commit_message>
[UGDG] Completed UGDG for ChangePasswordCommand and edited Backup docs
</commit_message>
<xml_diff>
--- a/docs/diagrams/LockUnlockDiagrams.pptx
+++ b/docs/diagrams/LockUnlockDiagrams.pptx
@@ -104,6 +104,11 @@
       </a:defRPr>
     </a:lvl9pPr>
   </p:defaultTextStyle>
+  <p:extLst>
+    <p:ext uri="{EFAFB233-063F-42B5-8137-9DF3F51BA10A}">
+      <p15:sldGuideLst xmlns:p15="http://schemas.microsoft.com/office/powerpoint/2012/main"/>
+    </p:ext>
+  </p:extLst>
 </p:presentation>
 </file>
 
@@ -2972,8 +2977,8 @@
         </p:nvSpPr>
         <p:spPr>
           <a:xfrm>
-            <a:off x="181322" y="321030"/>
-            <a:ext cx="10165836" cy="6272275"/>
+            <a:off x="181321" y="321030"/>
+            <a:ext cx="11838225" cy="6272275"/>
           </a:xfrm>
           <a:prstGeom prst="rect">
             <a:avLst/>
@@ -3682,9 +3687,9 @@
           <p:nvPr/>
         </p:nvCxnSpPr>
         <p:spPr>
-          <a:xfrm flipH="1" flipV="1">
-            <a:off x="9199118" y="1045732"/>
-            <a:ext cx="1" cy="2090763"/>
+          <a:xfrm flipV="1">
+            <a:off x="9199119" y="1286364"/>
+            <a:ext cx="0" cy="1850131"/>
           </a:xfrm>
           <a:prstGeom prst="line">
             <a:avLst/>
@@ -3713,7 +3718,7 @@
         </p:nvCxnSpPr>
         <p:spPr>
           <a:xfrm flipH="1">
-            <a:off x="5422737" y="1045732"/>
+            <a:off x="5422737" y="1286364"/>
             <a:ext cx="3776381" cy="0"/>
           </a:xfrm>
           <a:prstGeom prst="straightConnector1">
@@ -3746,7 +3751,7 @@
         </p:nvSpPr>
         <p:spPr>
           <a:xfrm>
-            <a:off x="7905509" y="542953"/>
+            <a:off x="7734592" y="1331483"/>
             <a:ext cx="1432956" cy="492443"/>
           </a:xfrm>
           <a:prstGeom prst="rect">
@@ -3989,9 +3994,9 @@
           <p:nvPr/>
         </p:nvCxnSpPr>
         <p:spPr>
-          <a:xfrm flipH="1">
+          <a:xfrm flipH="1" flipV="1">
             <a:off x="360947" y="6412832"/>
-            <a:ext cx="5061790" cy="0"/>
+            <a:ext cx="5061790" cy="12031"/>
           </a:xfrm>
           <a:prstGeom prst="line">
             <a:avLst/>
@@ -4408,6 +4413,487 @@
           </a:p>
         </p:txBody>
       </p:sp>
+      <p:cxnSp>
+        <p:nvCxnSpPr>
+          <p:cNvPr id="3" name="Straight Connector 2"/>
+          <p:cNvCxnSpPr/>
+          <p:nvPr/>
+        </p:nvCxnSpPr>
+        <p:spPr>
+          <a:xfrm>
+            <a:off x="5422737" y="6412831"/>
+            <a:ext cx="6139611" cy="0"/>
+          </a:xfrm>
+          <a:prstGeom prst="line">
+            <a:avLst/>
+          </a:prstGeom>
+        </p:spPr>
+        <p:style>
+          <a:lnRef idx="1">
+            <a:schemeClr val="accent1"/>
+          </a:lnRef>
+          <a:fillRef idx="0">
+            <a:schemeClr val="accent1"/>
+          </a:fillRef>
+          <a:effectRef idx="0">
+            <a:schemeClr val="accent1"/>
+          </a:effectRef>
+          <a:fontRef idx="minor">
+            <a:schemeClr val="tx1"/>
+          </a:fontRef>
+        </p:style>
+      </p:cxnSp>
+      <p:sp>
+        <p:nvSpPr>
+          <p:cNvPr id="13" name="TextBox 12"/>
+          <p:cNvSpPr txBox="1"/>
+          <p:nvPr/>
+        </p:nvSpPr>
+        <p:spPr>
+          <a:xfrm>
+            <a:off x="10195208" y="2546988"/>
+            <a:ext cx="1204176" cy="292388"/>
+          </a:xfrm>
+          <a:prstGeom prst="rect">
+            <a:avLst/>
+          </a:prstGeom>
+          <a:noFill/>
+        </p:spPr>
+        <p:txBody>
+          <a:bodyPr wrap="none" rtlCol="0">
+            <a:spAutoFit/>
+          </a:bodyPr>
+          <a:lstStyle/>
+          <a:p>
+            <a:pPr algn="ctr"/>
+            <a:r>
+              <a:rPr lang="en-US" sz="1300" b="1" dirty="0" smtClean="0"/>
+              <a:t>lock </a:t>
+            </a:r>
+            <a:r>
+              <a:rPr lang="en-US" sz="1300" dirty="0" smtClean="0"/>
+              <a:t>Command</a:t>
+            </a:r>
+            <a:endParaRPr lang="en-US" sz="1300" dirty="0"/>
+          </a:p>
+        </p:txBody>
+      </p:sp>
+      <p:cxnSp>
+        <p:nvCxnSpPr>
+          <p:cNvPr id="16" name="Straight Connector 15"/>
+          <p:cNvCxnSpPr>
+            <a:endCxn id="53" idx="2"/>
+          </p:cNvCxnSpPr>
+          <p:nvPr/>
+        </p:nvCxnSpPr>
+        <p:spPr>
+          <a:xfrm flipV="1">
+            <a:off x="11562348" y="2790144"/>
+            <a:ext cx="5752" cy="3622688"/>
+          </a:xfrm>
+          <a:prstGeom prst="line">
+            <a:avLst/>
+          </a:prstGeom>
+        </p:spPr>
+        <p:style>
+          <a:lnRef idx="1">
+            <a:schemeClr val="accent1"/>
+          </a:lnRef>
+          <a:fillRef idx="0">
+            <a:schemeClr val="accent1"/>
+          </a:fillRef>
+          <a:effectRef idx="0">
+            <a:schemeClr val="accent1"/>
+          </a:effectRef>
+          <a:fontRef idx="minor">
+            <a:schemeClr val="tx1"/>
+          </a:fontRef>
+        </p:style>
+      </p:cxnSp>
+      <p:sp>
+        <p:nvSpPr>
+          <p:cNvPr id="51" name="TextBox 50"/>
+          <p:cNvSpPr txBox="1"/>
+          <p:nvPr/>
+        </p:nvSpPr>
+        <p:spPr>
+          <a:xfrm rot="5400000">
+            <a:off x="11051088" y="1462788"/>
+            <a:ext cx="1383712" cy="292388"/>
+          </a:xfrm>
+          <a:prstGeom prst="rect">
+            <a:avLst/>
+          </a:prstGeom>
+          <a:noFill/>
+        </p:spPr>
+        <p:txBody>
+          <a:bodyPr wrap="none" rtlCol="0">
+            <a:spAutoFit/>
+          </a:bodyPr>
+          <a:lstStyle/>
+          <a:p>
+            <a:pPr algn="ctr"/>
+            <a:r>
+              <a:rPr lang="en-US" sz="1300" b="1" smtClean="0"/>
+              <a:t>unlock </a:t>
+            </a:r>
+            <a:r>
+              <a:rPr lang="en-US" sz="1300" smtClean="0"/>
+              <a:t>Command</a:t>
+            </a:r>
+            <a:endParaRPr lang="en-US" sz="1300" dirty="0"/>
+          </a:p>
+        </p:txBody>
+      </p:sp>
+      <p:sp>
+        <p:nvSpPr>
+          <p:cNvPr id="53" name="Diamond 52"/>
+          <p:cNvSpPr/>
+          <p:nvPr/>
+        </p:nvSpPr>
+        <p:spPr>
+          <a:xfrm>
+            <a:off x="11339369" y="2332682"/>
+            <a:ext cx="457462" cy="457462"/>
+          </a:xfrm>
+          <a:prstGeom prst="diamond">
+            <a:avLst/>
+          </a:prstGeom>
+          <a:solidFill>
+            <a:schemeClr val="accent2"/>
+          </a:solidFill>
+        </p:spPr>
+        <p:style>
+          <a:lnRef idx="2">
+            <a:schemeClr val="accent1">
+              <a:shade val="50000"/>
+            </a:schemeClr>
+          </a:lnRef>
+          <a:fillRef idx="1">
+            <a:schemeClr val="accent1"/>
+          </a:fillRef>
+          <a:effectRef idx="0">
+            <a:schemeClr val="accent1"/>
+          </a:effectRef>
+          <a:fontRef idx="minor">
+            <a:schemeClr val="lt1"/>
+          </a:fontRef>
+        </p:style>
+        <p:txBody>
+          <a:bodyPr rtlCol="0" anchor="ctr"/>
+          <a:lstStyle/>
+          <a:p>
+            <a:pPr algn="ctr"/>
+            <a:endParaRPr lang="en-US"/>
+          </a:p>
+        </p:txBody>
+      </p:sp>
+      <p:cxnSp>
+        <p:nvCxnSpPr>
+          <p:cNvPr id="20" name="Straight Connector 19"/>
+          <p:cNvCxnSpPr/>
+          <p:nvPr/>
+        </p:nvCxnSpPr>
+        <p:spPr>
+          <a:xfrm flipH="1">
+            <a:off x="9784555" y="2561413"/>
+            <a:ext cx="1547404" cy="0"/>
+          </a:xfrm>
+          <a:prstGeom prst="line">
+            <a:avLst/>
+          </a:prstGeom>
+        </p:spPr>
+        <p:style>
+          <a:lnRef idx="1">
+            <a:schemeClr val="accent1"/>
+          </a:lnRef>
+          <a:fillRef idx="0">
+            <a:schemeClr val="accent1"/>
+          </a:fillRef>
+          <a:effectRef idx="0">
+            <a:schemeClr val="accent1"/>
+          </a:effectRef>
+          <a:fontRef idx="minor">
+            <a:schemeClr val="tx1"/>
+          </a:fontRef>
+        </p:style>
+      </p:cxnSp>
+      <p:sp>
+        <p:nvSpPr>
+          <p:cNvPr id="27" name="TextBox 26"/>
+          <p:cNvSpPr txBox="1"/>
+          <p:nvPr/>
+        </p:nvSpPr>
+        <p:spPr>
+          <a:xfrm>
+            <a:off x="9306476" y="1654507"/>
+            <a:ext cx="956159" cy="646331"/>
+          </a:xfrm>
+          <a:prstGeom prst="rect">
+            <a:avLst/>
+          </a:prstGeom>
+        </p:spPr>
+        <p:style>
+          <a:lnRef idx="2">
+            <a:schemeClr val="dk1">
+              <a:shade val="50000"/>
+            </a:schemeClr>
+          </a:lnRef>
+          <a:fillRef idx="1">
+            <a:schemeClr val="dk1"/>
+          </a:fillRef>
+          <a:effectRef idx="0">
+            <a:schemeClr val="dk1"/>
+          </a:effectRef>
+          <a:fontRef idx="minor">
+            <a:schemeClr val="lt1"/>
+          </a:fontRef>
+        </p:style>
+        <p:txBody>
+          <a:bodyPr wrap="none" rtlCol="0">
+            <a:spAutoFit/>
+          </a:bodyPr>
+          <a:lstStyle/>
+          <a:p>
+            <a:pPr algn="ctr"/>
+            <a:r>
+              <a:rPr lang="en-US" dirty="0" smtClean="0"/>
+              <a:t>Set Lock</a:t>
+            </a:r>
+          </a:p>
+          <a:p>
+            <a:pPr algn="ctr"/>
+            <a:r>
+              <a:rPr lang="en-US" b="1" dirty="0" smtClean="0"/>
+              <a:t>True</a:t>
+            </a:r>
+            <a:endParaRPr lang="en-US" b="1" dirty="0"/>
+          </a:p>
+        </p:txBody>
+      </p:sp>
+      <p:cxnSp>
+        <p:nvCxnSpPr>
+          <p:cNvPr id="31" name="Straight Arrow Connector 30"/>
+          <p:cNvCxnSpPr>
+            <a:endCxn id="27" idx="2"/>
+          </p:cNvCxnSpPr>
+          <p:nvPr/>
+        </p:nvCxnSpPr>
+        <p:spPr>
+          <a:xfrm flipV="1">
+            <a:off x="9784555" y="2300838"/>
+            <a:ext cx="1" cy="261574"/>
+          </a:xfrm>
+          <a:prstGeom prst="straightConnector1">
+            <a:avLst/>
+          </a:prstGeom>
+          <a:ln>
+            <a:tailEnd type="triangle"/>
+          </a:ln>
+        </p:spPr>
+        <p:style>
+          <a:lnRef idx="1">
+            <a:schemeClr val="accent1"/>
+          </a:lnRef>
+          <a:fillRef idx="0">
+            <a:schemeClr val="accent1"/>
+          </a:fillRef>
+          <a:effectRef idx="0">
+            <a:schemeClr val="accent1"/>
+          </a:effectRef>
+          <a:fontRef idx="minor">
+            <a:schemeClr val="tx1"/>
+          </a:fontRef>
+        </p:style>
+      </p:cxnSp>
+      <p:cxnSp>
+        <p:nvCxnSpPr>
+          <p:cNvPr id="45" name="Straight Connector 44"/>
+          <p:cNvCxnSpPr>
+            <a:stCxn id="53" idx="0"/>
+          </p:cNvCxnSpPr>
+          <p:nvPr/>
+        </p:nvCxnSpPr>
+        <p:spPr>
+          <a:xfrm flipV="1">
+            <a:off x="11568100" y="868542"/>
+            <a:ext cx="0" cy="1464140"/>
+          </a:xfrm>
+          <a:prstGeom prst="line">
+            <a:avLst/>
+          </a:prstGeom>
+        </p:spPr>
+        <p:style>
+          <a:lnRef idx="1">
+            <a:schemeClr val="accent1"/>
+          </a:lnRef>
+          <a:fillRef idx="0">
+            <a:schemeClr val="accent1"/>
+          </a:fillRef>
+          <a:effectRef idx="0">
+            <a:schemeClr val="accent1"/>
+          </a:effectRef>
+          <a:fontRef idx="minor">
+            <a:schemeClr val="tx1"/>
+          </a:fontRef>
+        </p:style>
+      </p:cxnSp>
+      <p:sp>
+        <p:nvSpPr>
+          <p:cNvPr id="67" name="TextBox 66"/>
+          <p:cNvSpPr txBox="1"/>
+          <p:nvPr/>
+        </p:nvSpPr>
+        <p:spPr>
+          <a:xfrm>
+            <a:off x="9902654" y="485406"/>
+            <a:ext cx="956159" cy="646331"/>
+          </a:xfrm>
+          <a:prstGeom prst="rect">
+            <a:avLst/>
+          </a:prstGeom>
+        </p:spPr>
+        <p:style>
+          <a:lnRef idx="2">
+            <a:schemeClr val="dk1">
+              <a:shade val="50000"/>
+            </a:schemeClr>
+          </a:lnRef>
+          <a:fillRef idx="1">
+            <a:schemeClr val="dk1"/>
+          </a:fillRef>
+          <a:effectRef idx="0">
+            <a:schemeClr val="dk1"/>
+          </a:effectRef>
+          <a:fontRef idx="minor">
+            <a:schemeClr val="lt1"/>
+          </a:fontRef>
+        </p:style>
+        <p:txBody>
+          <a:bodyPr wrap="none" rtlCol="0">
+            <a:spAutoFit/>
+          </a:bodyPr>
+          <a:lstStyle/>
+          <a:p>
+            <a:pPr algn="ctr"/>
+            <a:r>
+              <a:rPr lang="en-US" dirty="0" smtClean="0"/>
+              <a:t>Set Lock</a:t>
+            </a:r>
+          </a:p>
+          <a:p>
+            <a:pPr algn="ctr"/>
+            <a:r>
+              <a:rPr lang="en-US" b="1" dirty="0" smtClean="0"/>
+              <a:t>False</a:t>
+            </a:r>
+            <a:endParaRPr lang="en-US" b="1" dirty="0"/>
+          </a:p>
+        </p:txBody>
+      </p:sp>
+      <p:cxnSp>
+        <p:nvCxnSpPr>
+          <p:cNvPr id="48" name="Straight Arrow Connector 47"/>
+          <p:cNvCxnSpPr/>
+          <p:nvPr/>
+        </p:nvCxnSpPr>
+        <p:spPr>
+          <a:xfrm flipH="1">
+            <a:off x="10858813" y="868542"/>
+            <a:ext cx="703535" cy="0"/>
+          </a:xfrm>
+          <a:prstGeom prst="straightConnector1">
+            <a:avLst/>
+          </a:prstGeom>
+          <a:ln>
+            <a:tailEnd type="triangle"/>
+          </a:ln>
+        </p:spPr>
+        <p:style>
+          <a:lnRef idx="1">
+            <a:schemeClr val="accent1"/>
+          </a:lnRef>
+          <a:fillRef idx="0">
+            <a:schemeClr val="accent1"/>
+          </a:fillRef>
+          <a:effectRef idx="0">
+            <a:schemeClr val="accent1"/>
+          </a:effectRef>
+          <a:fontRef idx="minor">
+            <a:schemeClr val="tx1"/>
+          </a:fontRef>
+        </p:style>
+      </p:cxnSp>
+      <p:cxnSp>
+        <p:nvCxnSpPr>
+          <p:cNvPr id="54" name="Straight Arrow Connector 53"/>
+          <p:cNvCxnSpPr>
+            <a:stCxn id="67" idx="1"/>
+          </p:cNvCxnSpPr>
+          <p:nvPr/>
+        </p:nvCxnSpPr>
+        <p:spPr>
+          <a:xfrm flipH="1" flipV="1">
+            <a:off x="5422737" y="808571"/>
+            <a:ext cx="4479917" cy="1"/>
+          </a:xfrm>
+          <a:prstGeom prst="straightConnector1">
+            <a:avLst/>
+          </a:prstGeom>
+          <a:ln>
+            <a:tailEnd type="triangle"/>
+          </a:ln>
+        </p:spPr>
+        <p:style>
+          <a:lnRef idx="1">
+            <a:schemeClr val="accent1"/>
+          </a:lnRef>
+          <a:fillRef idx="0">
+            <a:schemeClr val="accent1"/>
+          </a:fillRef>
+          <a:effectRef idx="0">
+            <a:schemeClr val="accent1"/>
+          </a:effectRef>
+          <a:fontRef idx="minor">
+            <a:schemeClr val="tx1"/>
+          </a:fontRef>
+        </p:style>
+      </p:cxnSp>
+      <p:cxnSp>
+        <p:nvCxnSpPr>
+          <p:cNvPr id="57" name="Straight Arrow Connector 56"/>
+          <p:cNvCxnSpPr>
+            <a:stCxn id="27" idx="0"/>
+          </p:cNvCxnSpPr>
+          <p:nvPr/>
+        </p:nvCxnSpPr>
+        <p:spPr>
+          <a:xfrm flipH="1" flipV="1">
+            <a:off x="9784555" y="808571"/>
+            <a:ext cx="1" cy="845936"/>
+          </a:xfrm>
+          <a:prstGeom prst="straightConnector1">
+            <a:avLst/>
+          </a:prstGeom>
+          <a:ln>
+            <a:tailEnd type="triangle"/>
+          </a:ln>
+        </p:spPr>
+        <p:style>
+          <a:lnRef idx="1">
+            <a:schemeClr val="accent1"/>
+          </a:lnRef>
+          <a:fillRef idx="0">
+            <a:schemeClr val="accent1"/>
+          </a:fillRef>
+          <a:effectRef idx="0">
+            <a:schemeClr val="accent1"/>
+          </a:effectRef>
+          <a:fontRef idx="minor">
+            <a:schemeClr val="tx1"/>
+          </a:fontRef>
+        </p:style>
+      </p:cxnSp>
     </p:spTree>
     <p:extLst>
       <p:ext uri="{BB962C8B-B14F-4D97-AF65-F5344CB8AC3E}">

</xml_diff>